<commit_message>
Grades page being worked on
</commit_message>
<xml_diff>
--- a/Assignments/Gradebook App PowerPont/Austin Brand/Javascript_Gradebook_Storyboard.pptx
+++ b/Assignments/Gradebook App PowerPont/Austin Brand/Javascript_Gradebook_Storyboard.pptx
@@ -5763,7 +5763,7 @@
         </p:nvSpPr>
         <p:spPr>
           <a:xfrm>
-            <a:off x="221673" y="5535543"/>
+            <a:off x="251130" y="5535543"/>
             <a:ext cx="1898073" cy="707886"/>
           </a:xfrm>
           <a:prstGeom prst="rect">
@@ -5796,6 +5796,417 @@
               <a:t>Teacher Course History</a:t>
             </a:r>
             <a:endParaRPr lang="en-US" sz="2000" dirty="0"/>
+          </a:p>
+        </p:txBody>
+      </p:sp>
+      <p:graphicFrame>
+        <p:nvGraphicFramePr>
+          <p:cNvPr id="12" name="Table 11"/>
+          <p:cNvGraphicFramePr>
+            <a:graphicFrameLocks noGrp="1"/>
+          </p:cNvGraphicFramePr>
+          <p:nvPr>
+            <p:extLst>
+              <p:ext uri="{D42A27DB-BD31-4B8C-83A1-F6EECF244321}">
+                <p14:modId xmlns:p14="http://schemas.microsoft.com/office/powerpoint/2010/main" val="3843508669"/>
+              </p:ext>
+            </p:extLst>
+          </p:nvPr>
+        </p:nvGraphicFramePr>
+        <p:xfrm>
+          <a:off x="2514602" y="1414780"/>
+          <a:ext cx="6477000" cy="5227320"/>
+        </p:xfrm>
+        <a:graphic>
+          <a:graphicData uri="http://schemas.openxmlformats.org/drawingml/2006/table">
+            <a:tbl>
+              <a:tblPr firstRow="1" bandRow="1">
+                <a:tableStyleId>{5C22544A-7EE6-4342-B048-85BDC9FD1C3A}</a:tableStyleId>
+              </a:tblPr>
+              <a:tblGrid>
+                <a:gridCol w="1216338"/>
+                <a:gridCol w="1216338"/>
+                <a:gridCol w="1377322"/>
+                <a:gridCol w="1055354"/>
+                <a:gridCol w="1611648"/>
+              </a:tblGrid>
+              <a:tr h="871220">
+                <a:tc>
+                  <a:txBody>
+                    <a:bodyPr/>
+                    <a:lstStyle/>
+                    <a:p>
+                      <a:r>
+                        <a:rPr lang="en-US" dirty="0" smtClean="0"/>
+                        <a:t>Student Name</a:t>
+                      </a:r>
+                      <a:endParaRPr lang="en-US" dirty="0"/>
+                    </a:p>
+                  </a:txBody>
+                  <a:tcPr/>
+                </a:tc>
+                <a:tc>
+                  <a:txBody>
+                    <a:bodyPr/>
+                    <a:lstStyle/>
+                    <a:p>
+                      <a:r>
+                        <a:rPr lang="en-US" dirty="0" smtClean="0"/>
+                        <a:t>Email:</a:t>
+                      </a:r>
+                      <a:endParaRPr lang="en-US" dirty="0"/>
+                    </a:p>
+                  </a:txBody>
+                  <a:tcPr/>
+                </a:tc>
+                <a:tc>
+                  <a:txBody>
+                    <a:bodyPr/>
+                    <a:lstStyle/>
+                    <a:p>
+                      <a:r>
+                        <a:rPr lang="en-US" sz="1600" dirty="0" smtClean="0"/>
+                        <a:t>Assignments</a:t>
+                      </a:r>
+                      <a:endParaRPr lang="en-US" sz="1600" dirty="0"/>
+                    </a:p>
+                  </a:txBody>
+                  <a:tcPr/>
+                </a:tc>
+                <a:tc>
+                  <a:txBody>
+                    <a:bodyPr/>
+                    <a:lstStyle/>
+                    <a:p>
+                      <a:r>
+                        <a:rPr lang="en-US" dirty="0" smtClean="0"/>
+                        <a:t>Grade</a:t>
+                      </a:r>
+                      <a:endParaRPr lang="en-US" dirty="0"/>
+                    </a:p>
+                  </a:txBody>
+                  <a:tcPr/>
+                </a:tc>
+                <a:tc>
+                  <a:txBody>
+                    <a:bodyPr/>
+                    <a:lstStyle/>
+                    <a:p>
+                      <a:r>
+                        <a:rPr lang="en-US" dirty="0" smtClean="0"/>
+                        <a:t>Comments</a:t>
+                      </a:r>
+                      <a:endParaRPr lang="en-US" dirty="0"/>
+                    </a:p>
+                  </a:txBody>
+                  <a:tcPr/>
+                </a:tc>
+              </a:tr>
+              <a:tr h="871220">
+                <a:tc>
+                  <a:txBody>
+                    <a:bodyPr/>
+                    <a:lstStyle/>
+                    <a:p>
+                      <a:endParaRPr lang="en-US" dirty="0"/>
+                    </a:p>
+                  </a:txBody>
+                  <a:tcPr/>
+                </a:tc>
+                <a:tc>
+                  <a:txBody>
+                    <a:bodyPr/>
+                    <a:lstStyle/>
+                    <a:p>
+                      <a:endParaRPr lang="en-US" dirty="0"/>
+                    </a:p>
+                  </a:txBody>
+                  <a:tcPr/>
+                </a:tc>
+                <a:tc>
+                  <a:txBody>
+                    <a:bodyPr/>
+                    <a:lstStyle/>
+                    <a:p>
+                      <a:endParaRPr lang="en-US" sz="1600" dirty="0"/>
+                    </a:p>
+                  </a:txBody>
+                  <a:tcPr/>
+                </a:tc>
+                <a:tc>
+                  <a:txBody>
+                    <a:bodyPr/>
+                    <a:lstStyle/>
+                    <a:p>
+                      <a:endParaRPr lang="en-US" dirty="0"/>
+                    </a:p>
+                  </a:txBody>
+                  <a:tcPr/>
+                </a:tc>
+                <a:tc>
+                  <a:txBody>
+                    <a:bodyPr/>
+                    <a:lstStyle/>
+                    <a:p>
+                      <a:endParaRPr lang="en-US" dirty="0"/>
+                    </a:p>
+                  </a:txBody>
+                  <a:tcPr/>
+                </a:tc>
+              </a:tr>
+              <a:tr h="871220">
+                <a:tc>
+                  <a:txBody>
+                    <a:bodyPr/>
+                    <a:lstStyle/>
+                    <a:p>
+                      <a:endParaRPr lang="en-US" dirty="0"/>
+                    </a:p>
+                  </a:txBody>
+                  <a:tcPr/>
+                </a:tc>
+                <a:tc>
+                  <a:txBody>
+                    <a:bodyPr/>
+                    <a:lstStyle/>
+                    <a:p>
+                      <a:endParaRPr lang="en-US" dirty="0"/>
+                    </a:p>
+                  </a:txBody>
+                  <a:tcPr/>
+                </a:tc>
+                <a:tc>
+                  <a:txBody>
+                    <a:bodyPr/>
+                    <a:lstStyle/>
+                    <a:p>
+                      <a:endParaRPr lang="en-US" sz="1600" dirty="0"/>
+                    </a:p>
+                  </a:txBody>
+                  <a:tcPr/>
+                </a:tc>
+                <a:tc>
+                  <a:txBody>
+                    <a:bodyPr/>
+                    <a:lstStyle/>
+                    <a:p>
+                      <a:endParaRPr lang="en-US" dirty="0"/>
+                    </a:p>
+                  </a:txBody>
+                  <a:tcPr/>
+                </a:tc>
+                <a:tc>
+                  <a:txBody>
+                    <a:bodyPr/>
+                    <a:lstStyle/>
+                    <a:p>
+                      <a:endParaRPr lang="en-US" dirty="0"/>
+                    </a:p>
+                  </a:txBody>
+                  <a:tcPr/>
+                </a:tc>
+              </a:tr>
+              <a:tr h="871220">
+                <a:tc>
+                  <a:txBody>
+                    <a:bodyPr/>
+                    <a:lstStyle/>
+                    <a:p>
+                      <a:endParaRPr lang="en-US" dirty="0"/>
+                    </a:p>
+                  </a:txBody>
+                  <a:tcPr/>
+                </a:tc>
+                <a:tc>
+                  <a:txBody>
+                    <a:bodyPr/>
+                    <a:lstStyle/>
+                    <a:p>
+                      <a:endParaRPr lang="en-US" dirty="0"/>
+                    </a:p>
+                  </a:txBody>
+                  <a:tcPr/>
+                </a:tc>
+                <a:tc>
+                  <a:txBody>
+                    <a:bodyPr/>
+                    <a:lstStyle/>
+                    <a:p>
+                      <a:endParaRPr lang="en-US" sz="1600" dirty="0"/>
+                    </a:p>
+                  </a:txBody>
+                  <a:tcPr/>
+                </a:tc>
+                <a:tc>
+                  <a:txBody>
+                    <a:bodyPr/>
+                    <a:lstStyle/>
+                    <a:p>
+                      <a:endParaRPr lang="en-US" dirty="0"/>
+                    </a:p>
+                  </a:txBody>
+                  <a:tcPr/>
+                </a:tc>
+                <a:tc>
+                  <a:txBody>
+                    <a:bodyPr/>
+                    <a:lstStyle/>
+                    <a:p>
+                      <a:endParaRPr lang="en-US" dirty="0"/>
+                    </a:p>
+                  </a:txBody>
+                  <a:tcPr/>
+                </a:tc>
+              </a:tr>
+              <a:tr h="871220">
+                <a:tc>
+                  <a:txBody>
+                    <a:bodyPr/>
+                    <a:lstStyle/>
+                    <a:p>
+                      <a:endParaRPr lang="en-US" dirty="0"/>
+                    </a:p>
+                  </a:txBody>
+                  <a:tcPr/>
+                </a:tc>
+                <a:tc>
+                  <a:txBody>
+                    <a:bodyPr/>
+                    <a:lstStyle/>
+                    <a:p>
+                      <a:endParaRPr lang="en-US" dirty="0"/>
+                    </a:p>
+                  </a:txBody>
+                  <a:tcPr/>
+                </a:tc>
+                <a:tc>
+                  <a:txBody>
+                    <a:bodyPr/>
+                    <a:lstStyle/>
+                    <a:p>
+                      <a:endParaRPr lang="en-US" sz="1600" dirty="0"/>
+                    </a:p>
+                  </a:txBody>
+                  <a:tcPr/>
+                </a:tc>
+                <a:tc>
+                  <a:txBody>
+                    <a:bodyPr/>
+                    <a:lstStyle/>
+                    <a:p>
+                      <a:endParaRPr lang="en-US" dirty="0"/>
+                    </a:p>
+                  </a:txBody>
+                  <a:tcPr/>
+                </a:tc>
+                <a:tc>
+                  <a:txBody>
+                    <a:bodyPr/>
+                    <a:lstStyle/>
+                    <a:p>
+                      <a:endParaRPr lang="en-US" dirty="0"/>
+                    </a:p>
+                  </a:txBody>
+                  <a:tcPr/>
+                </a:tc>
+              </a:tr>
+              <a:tr h="871220">
+                <a:tc>
+                  <a:txBody>
+                    <a:bodyPr/>
+                    <a:lstStyle/>
+                    <a:p>
+                      <a:endParaRPr lang="en-US" dirty="0"/>
+                    </a:p>
+                  </a:txBody>
+                  <a:tcPr/>
+                </a:tc>
+                <a:tc>
+                  <a:txBody>
+                    <a:bodyPr/>
+                    <a:lstStyle/>
+                    <a:p>
+                      <a:endParaRPr lang="en-US" dirty="0"/>
+                    </a:p>
+                  </a:txBody>
+                  <a:tcPr/>
+                </a:tc>
+                <a:tc>
+                  <a:txBody>
+                    <a:bodyPr/>
+                    <a:lstStyle/>
+                    <a:p>
+                      <a:endParaRPr lang="en-US" sz="1600" dirty="0"/>
+                    </a:p>
+                  </a:txBody>
+                  <a:tcPr/>
+                </a:tc>
+                <a:tc>
+                  <a:txBody>
+                    <a:bodyPr/>
+                    <a:lstStyle/>
+                    <a:p>
+                      <a:endParaRPr lang="en-US" dirty="0"/>
+                    </a:p>
+                  </a:txBody>
+                  <a:tcPr/>
+                </a:tc>
+                <a:tc>
+                  <a:txBody>
+                    <a:bodyPr/>
+                    <a:lstStyle/>
+                    <a:p>
+                      <a:endParaRPr lang="en-US" dirty="0"/>
+                    </a:p>
+                  </a:txBody>
+                  <a:tcPr/>
+                </a:tc>
+              </a:tr>
+            </a:tbl>
+          </a:graphicData>
+        </a:graphic>
+      </p:graphicFrame>
+      <p:sp>
+        <p:nvSpPr>
+          <p:cNvPr id="13" name="TextBox 12"/>
+          <p:cNvSpPr txBox="1"/>
+          <p:nvPr/>
+        </p:nvSpPr>
+        <p:spPr>
+          <a:xfrm>
+            <a:off x="251130" y="4495800"/>
+            <a:ext cx="1901952" cy="461665"/>
+          </a:xfrm>
+          <a:prstGeom prst="rect">
+            <a:avLst/>
+          </a:prstGeom>
+        </p:spPr>
+        <p:style>
+          <a:lnRef idx="0">
+            <a:schemeClr val="accent4"/>
+          </a:lnRef>
+          <a:fillRef idx="3">
+            <a:schemeClr val="accent4"/>
+          </a:fillRef>
+          <a:effectRef idx="3">
+            <a:schemeClr val="accent4"/>
+          </a:effectRef>
+          <a:fontRef idx="minor">
+            <a:schemeClr val="lt1"/>
+          </a:fontRef>
+        </p:style>
+        <p:txBody>
+          <a:bodyPr wrap="square" rtlCol="0">
+            <a:spAutoFit/>
+          </a:bodyPr>
+          <a:lstStyle/>
+          <a:p>
+            <a:pPr algn="ctr"/>
+            <a:r>
+              <a:rPr lang="en-US" sz="2400" dirty="0" smtClean="0"/>
+              <a:t>Student List</a:t>
+            </a:r>
+            <a:endParaRPr lang="en-US" sz="2400" dirty="0"/>
           </a:p>
         </p:txBody>
       </p:sp>

</xml_diff>

<commit_message>
Gradebook up to date
</commit_message>
<xml_diff>
--- a/Assignments/Gradebook App PowerPont/Austin Brand/Javascript_Gradebook_Storyboard.pptx
+++ b/Assignments/Gradebook App PowerPont/Austin Brand/Javascript_Gradebook_Storyboard.pptx
@@ -5808,14 +5808,14 @@
           <p:nvPr>
             <p:extLst>
               <p:ext uri="{D42A27DB-BD31-4B8C-83A1-F6EECF244321}">
-                <p14:modId xmlns:p14="http://schemas.microsoft.com/office/powerpoint/2010/main" val="3843508669"/>
+                <p14:modId xmlns:p14="http://schemas.microsoft.com/office/powerpoint/2010/main" val="1467951442"/>
               </p:ext>
             </p:extLst>
           </p:nvPr>
         </p:nvGraphicFramePr>
         <p:xfrm>
-          <a:off x="2514602" y="1414780"/>
-          <a:ext cx="6477000" cy="5227320"/>
+          <a:off x="2514600" y="3035807"/>
+          <a:ext cx="6477001" cy="3745085"/>
         </p:xfrm>
         <a:graphic>
           <a:graphicData uri="http://schemas.openxmlformats.org/drawingml/2006/table">
@@ -5824,13 +5824,14 @@
                 <a:tableStyleId>{5C22544A-7EE6-4342-B048-85BDC9FD1C3A}</a:tableStyleId>
               </a:tblPr>
               <a:tblGrid>
-                <a:gridCol w="1216338"/>
-                <a:gridCol w="1216338"/>
-                <a:gridCol w="1377322"/>
-                <a:gridCol w="1055354"/>
-                <a:gridCol w="1611648"/>
+                <a:gridCol w="1105997"/>
+                <a:gridCol w="935843"/>
+                <a:gridCol w="680613"/>
+                <a:gridCol w="669440"/>
+                <a:gridCol w="1542554"/>
+                <a:gridCol w="1542554"/>
               </a:tblGrid>
-              <a:tr h="871220">
+              <a:tr h="530787">
                 <a:tc>
                   <a:txBody>
                     <a:bodyPr/>
@@ -5865,10 +5866,10 @@
                     <a:lstStyle/>
                     <a:p>
                       <a:r>
-                        <a:rPr lang="en-US" sz="1600" dirty="0" smtClean="0"/>
-                        <a:t>Assignments</a:t>
+                        <a:rPr lang="en-US" dirty="0" smtClean="0"/>
+                        <a:t>A</a:t>
                       </a:r>
-                      <a:endParaRPr lang="en-US" sz="1600" dirty="0"/>
+                      <a:endParaRPr lang="en-US" dirty="0"/>
                     </a:p>
                   </a:txBody>
                   <a:tcPr/>
@@ -5880,7 +5881,7 @@
                     <a:p>
                       <a:r>
                         <a:rPr lang="en-US" dirty="0" smtClean="0"/>
-                        <a:t>Grade</a:t>
+                        <a:t>A</a:t>
                       </a:r>
                       <a:endParaRPr lang="en-US" dirty="0"/>
                     </a:p>
@@ -5901,8 +5902,26 @@
                   </a:txBody>
                   <a:tcPr/>
                 </a:tc>
+                <a:tc>
+                  <a:txBody>
+                    <a:bodyPr/>
+                    <a:lstStyle/>
+                    <a:p>
+                      <a:r>
+                        <a:rPr lang="en-US" dirty="0" smtClean="0"/>
+                        <a:t>Grade in</a:t>
+                      </a:r>
+                      <a:r>
+                        <a:rPr lang="en-US" baseline="0" dirty="0" smtClean="0"/>
+                        <a:t> Class</a:t>
+                      </a:r>
+                      <a:endParaRPr lang="en-US" dirty="0"/>
+                    </a:p>
+                  </a:txBody>
+                  <a:tcPr/>
+                </a:tc>
               </a:tr>
-              <a:tr h="871220">
+              <a:tr h="621001">
                 <a:tc>
                   <a:txBody>
                     <a:bodyPr/>
@@ -5928,16 +5947,6 @@
                     <a:bodyPr/>
                     <a:lstStyle/>
                     <a:p>
-                      <a:endParaRPr lang="en-US" sz="1600" dirty="0"/>
-                    </a:p>
-                  </a:txBody>
-                  <a:tcPr/>
-                </a:tc>
-                <a:tc>
-                  <a:txBody>
-                    <a:bodyPr/>
-                    <a:lstStyle/>
-                    <a:p>
                       <a:endParaRPr lang="en-US" dirty="0"/>
                     </a:p>
                   </a:txBody>
@@ -5953,8 +5962,28 @@
                   </a:txBody>
                   <a:tcPr/>
                 </a:tc>
+                <a:tc>
+                  <a:txBody>
+                    <a:bodyPr/>
+                    <a:lstStyle/>
+                    <a:p>
+                      <a:endParaRPr lang="en-US" dirty="0"/>
+                    </a:p>
+                  </a:txBody>
+                  <a:tcPr/>
+                </a:tc>
+                <a:tc>
+                  <a:txBody>
+                    <a:bodyPr/>
+                    <a:lstStyle/>
+                    <a:p>
+                      <a:endParaRPr lang="en-US" dirty="0"/>
+                    </a:p>
+                  </a:txBody>
+                  <a:tcPr/>
+                </a:tc>
               </a:tr>
-              <a:tr h="871220">
+              <a:tr h="621001">
                 <a:tc>
                   <a:txBody>
                     <a:bodyPr/>
@@ -5980,16 +6009,6 @@
                     <a:bodyPr/>
                     <a:lstStyle/>
                     <a:p>
-                      <a:endParaRPr lang="en-US" sz="1600" dirty="0"/>
-                    </a:p>
-                  </a:txBody>
-                  <a:tcPr/>
-                </a:tc>
-                <a:tc>
-                  <a:txBody>
-                    <a:bodyPr/>
-                    <a:lstStyle/>
-                    <a:p>
                       <a:endParaRPr lang="en-US" dirty="0"/>
                     </a:p>
                   </a:txBody>
@@ -6005,8 +6024,28 @@
                   </a:txBody>
                   <a:tcPr/>
                 </a:tc>
+                <a:tc>
+                  <a:txBody>
+                    <a:bodyPr/>
+                    <a:lstStyle/>
+                    <a:p>
+                      <a:endParaRPr lang="en-US" dirty="0"/>
+                    </a:p>
+                  </a:txBody>
+                  <a:tcPr/>
+                </a:tc>
+                <a:tc>
+                  <a:txBody>
+                    <a:bodyPr/>
+                    <a:lstStyle/>
+                    <a:p>
+                      <a:endParaRPr lang="en-US" dirty="0"/>
+                    </a:p>
+                  </a:txBody>
+                  <a:tcPr/>
+                </a:tc>
               </a:tr>
-              <a:tr h="871220">
+              <a:tr h="621001">
                 <a:tc>
                   <a:txBody>
                     <a:bodyPr/>
@@ -6032,16 +6071,6 @@
                     <a:bodyPr/>
                     <a:lstStyle/>
                     <a:p>
-                      <a:endParaRPr lang="en-US" sz="1600" dirty="0"/>
-                    </a:p>
-                  </a:txBody>
-                  <a:tcPr/>
-                </a:tc>
-                <a:tc>
-                  <a:txBody>
-                    <a:bodyPr/>
-                    <a:lstStyle/>
-                    <a:p>
                       <a:endParaRPr lang="en-US" dirty="0"/>
                     </a:p>
                   </a:txBody>
@@ -6057,8 +6086,28 @@
                   </a:txBody>
                   <a:tcPr/>
                 </a:tc>
+                <a:tc>
+                  <a:txBody>
+                    <a:bodyPr/>
+                    <a:lstStyle/>
+                    <a:p>
+                      <a:endParaRPr lang="en-US" dirty="0"/>
+                    </a:p>
+                  </a:txBody>
+                  <a:tcPr/>
+                </a:tc>
+                <a:tc>
+                  <a:txBody>
+                    <a:bodyPr/>
+                    <a:lstStyle/>
+                    <a:p>
+                      <a:endParaRPr lang="en-US" dirty="0"/>
+                    </a:p>
+                  </a:txBody>
+                  <a:tcPr/>
+                </a:tc>
               </a:tr>
-              <a:tr h="871220">
+              <a:tr h="621001">
                 <a:tc>
                   <a:txBody>
                     <a:bodyPr/>
@@ -6084,16 +6133,6 @@
                     <a:bodyPr/>
                     <a:lstStyle/>
                     <a:p>
-                      <a:endParaRPr lang="en-US" sz="1600" dirty="0"/>
-                    </a:p>
-                  </a:txBody>
-                  <a:tcPr/>
-                </a:tc>
-                <a:tc>
-                  <a:txBody>
-                    <a:bodyPr/>
-                    <a:lstStyle/>
-                    <a:p>
                       <a:endParaRPr lang="en-US" dirty="0"/>
                     </a:p>
                   </a:txBody>
@@ -6109,8 +6148,28 @@
                   </a:txBody>
                   <a:tcPr/>
                 </a:tc>
+                <a:tc>
+                  <a:txBody>
+                    <a:bodyPr/>
+                    <a:lstStyle/>
+                    <a:p>
+                      <a:endParaRPr lang="en-US" dirty="0"/>
+                    </a:p>
+                  </a:txBody>
+                  <a:tcPr/>
+                </a:tc>
+                <a:tc>
+                  <a:txBody>
+                    <a:bodyPr/>
+                    <a:lstStyle/>
+                    <a:p>
+                      <a:endParaRPr lang="en-US" dirty="0"/>
+                    </a:p>
+                  </a:txBody>
+                  <a:tcPr/>
+                </a:tc>
               </a:tr>
-              <a:tr h="871220">
+              <a:tr h="621001">
                 <a:tc>
                   <a:txBody>
                     <a:bodyPr/>
@@ -6136,7 +6195,17 @@
                     <a:bodyPr/>
                     <a:lstStyle/>
                     <a:p>
-                      <a:endParaRPr lang="en-US" sz="1600" dirty="0"/>
+                      <a:endParaRPr lang="en-US" dirty="0"/>
+                    </a:p>
+                  </a:txBody>
+                  <a:tcPr/>
+                </a:tc>
+                <a:tc>
+                  <a:txBody>
+                    <a:bodyPr/>
+                    <a:lstStyle/>
+                    <a:p>
+                      <a:endParaRPr lang="en-US" dirty="0"/>
                     </a:p>
                   </a:txBody>
                   <a:tcPr/>
@@ -6210,6 +6279,241 @@
           </a:p>
         </p:txBody>
       </p:sp>
+      <p:graphicFrame>
+        <p:nvGraphicFramePr>
+          <p:cNvPr id="16" name="Table 15"/>
+          <p:cNvGraphicFramePr>
+            <a:graphicFrameLocks noGrp="1"/>
+          </p:cNvGraphicFramePr>
+          <p:nvPr>
+            <p:extLst>
+              <p:ext uri="{D42A27DB-BD31-4B8C-83A1-F6EECF244321}">
+                <p14:modId xmlns:p14="http://schemas.microsoft.com/office/powerpoint/2010/main" val="3562640432"/>
+              </p:ext>
+            </p:extLst>
+          </p:nvPr>
+        </p:nvGraphicFramePr>
+        <p:xfrm>
+          <a:off x="2514600" y="1393190"/>
+          <a:ext cx="6553200" cy="414020"/>
+        </p:xfrm>
+        <a:graphic>
+          <a:graphicData uri="http://schemas.openxmlformats.org/drawingml/2006/table">
+            <a:tbl>
+              <a:tblPr firstRow="1" bandRow="1">
+                <a:tableStyleId>{5C22544A-7EE6-4342-B048-85BDC9FD1C3A}</a:tableStyleId>
+              </a:tblPr>
+              <a:tblGrid>
+                <a:gridCol w="6553200"/>
+              </a:tblGrid>
+              <a:tr h="414020">
+                <a:tc>
+                  <a:txBody>
+                    <a:bodyPr/>
+                    <a:lstStyle/>
+                    <a:p>
+                      <a:r>
+                        <a:rPr lang="en-US" dirty="0" smtClean="0"/>
+                        <a:t>Assignments: </a:t>
+                      </a:r>
+                      <a:endParaRPr lang="en-US" dirty="0"/>
+                    </a:p>
+                  </a:txBody>
+                  <a:tcPr/>
+                </a:tc>
+              </a:tr>
+            </a:tbl>
+          </a:graphicData>
+        </a:graphic>
+      </p:graphicFrame>
+      <p:graphicFrame>
+        <p:nvGraphicFramePr>
+          <p:cNvPr id="17" name="Table 16"/>
+          <p:cNvGraphicFramePr>
+            <a:graphicFrameLocks noGrp="1"/>
+          </p:cNvGraphicFramePr>
+          <p:nvPr>
+            <p:extLst>
+              <p:ext uri="{D42A27DB-BD31-4B8C-83A1-F6EECF244321}">
+                <p14:modId xmlns:p14="http://schemas.microsoft.com/office/powerpoint/2010/main" val="3892285280"/>
+              </p:ext>
+            </p:extLst>
+          </p:nvPr>
+        </p:nvGraphicFramePr>
+        <p:xfrm>
+          <a:off x="2514600" y="1830426"/>
+          <a:ext cx="6096000" cy="640080"/>
+        </p:xfrm>
+        <a:graphic>
+          <a:graphicData uri="http://schemas.openxmlformats.org/drawingml/2006/table">
+            <a:tbl>
+              <a:tblPr firstRow="1" bandRow="1">
+                <a:tableStyleId>{5C22544A-7EE6-4342-B048-85BDC9FD1C3A}</a:tableStyleId>
+              </a:tblPr>
+              <a:tblGrid>
+                <a:gridCol w="1219200"/>
+                <a:gridCol w="812800"/>
+                <a:gridCol w="1016000"/>
+                <a:gridCol w="1016000"/>
+                <a:gridCol w="1016000"/>
+                <a:gridCol w="1016000"/>
+              </a:tblGrid>
+              <a:tr h="370840">
+                <a:tc>
+                  <a:txBody>
+                    <a:bodyPr/>
+                    <a:lstStyle/>
+                    <a:p>
+                      <a:r>
+                        <a:rPr lang="en-US" dirty="0" smtClean="0"/>
+                        <a:t>Classroom CRUD</a:t>
+                      </a:r>
+                      <a:endParaRPr lang="en-US" dirty="0"/>
+                    </a:p>
+                  </a:txBody>
+                  <a:tcPr/>
+                </a:tc>
+                <a:tc>
+                  <a:txBody>
+                    <a:bodyPr/>
+                    <a:lstStyle/>
+                    <a:p>
+                      <a:r>
+                        <a:rPr lang="en-US" u="sng" dirty="0" smtClean="0"/>
+                        <a:t>Add</a:t>
+                      </a:r>
+                      <a:endParaRPr lang="en-US" u="sng" dirty="0"/>
+                    </a:p>
+                  </a:txBody>
+                  <a:tcPr/>
+                </a:tc>
+                <a:tc>
+                  <a:txBody>
+                    <a:bodyPr/>
+                    <a:lstStyle/>
+                    <a:p>
+                      <a:r>
+                        <a:rPr lang="en-US" u="sng" dirty="0" smtClean="0"/>
+                        <a:t>Add</a:t>
+                      </a:r>
+                      <a:endParaRPr lang="en-US" u="sng" dirty="0"/>
+                    </a:p>
+                  </a:txBody>
+                  <a:tcPr/>
+                </a:tc>
+                <a:tc>
+                  <a:txBody>
+                    <a:bodyPr/>
+                    <a:lstStyle/>
+                    <a:p>
+                      <a:r>
+                        <a:rPr lang="en-US" u="sng" dirty="0" smtClean="0"/>
+                        <a:t>Add</a:t>
+                      </a:r>
+                      <a:endParaRPr lang="en-US" u="sng" dirty="0"/>
+                    </a:p>
+                  </a:txBody>
+                  <a:tcPr/>
+                </a:tc>
+                <a:tc>
+                  <a:txBody>
+                    <a:bodyPr/>
+                    <a:lstStyle/>
+                    <a:p>
+                      <a:r>
+                        <a:rPr lang="en-US" u="sng" dirty="0" smtClean="0"/>
+                        <a:t>Add</a:t>
+                      </a:r>
+                      <a:endParaRPr lang="en-US" u="sng" dirty="0"/>
+                    </a:p>
+                  </a:txBody>
+                  <a:tcPr/>
+                </a:tc>
+                <a:tc>
+                  <a:txBody>
+                    <a:bodyPr/>
+                    <a:lstStyle/>
+                    <a:p>
+                      <a:r>
+                        <a:rPr lang="en-US" u="sng" dirty="0" smtClean="0"/>
+                        <a:t>Add</a:t>
+                      </a:r>
+                      <a:endParaRPr lang="en-US" u="sng" dirty="0"/>
+                    </a:p>
+                  </a:txBody>
+                  <a:tcPr/>
+                </a:tc>
+              </a:tr>
+            </a:tbl>
+          </a:graphicData>
+        </a:graphic>
+      </p:graphicFrame>
+      <p:cxnSp>
+        <p:nvCxnSpPr>
+          <p:cNvPr id="19" name="Straight Arrow Connector 18"/>
+          <p:cNvCxnSpPr/>
+          <p:nvPr/>
+        </p:nvCxnSpPr>
+        <p:spPr>
+          <a:xfrm>
+            <a:off x="4191000" y="2514599"/>
+            <a:ext cx="533400" cy="521208"/>
+          </a:xfrm>
+          <a:prstGeom prst="straightConnector1">
+            <a:avLst/>
+          </a:prstGeom>
+          <a:ln>
+            <a:tailEnd type="arrow"/>
+          </a:ln>
+        </p:spPr>
+        <p:style>
+          <a:lnRef idx="3">
+            <a:schemeClr val="accent4"/>
+          </a:lnRef>
+          <a:fillRef idx="0">
+            <a:schemeClr val="accent4"/>
+          </a:fillRef>
+          <a:effectRef idx="2">
+            <a:schemeClr val="accent4"/>
+          </a:effectRef>
+          <a:fontRef idx="minor">
+            <a:schemeClr val="tx1"/>
+          </a:fontRef>
+        </p:style>
+      </p:cxnSp>
+      <p:cxnSp>
+        <p:nvCxnSpPr>
+          <p:cNvPr id="21" name="Straight Arrow Connector 20"/>
+          <p:cNvCxnSpPr/>
+          <p:nvPr/>
+        </p:nvCxnSpPr>
+        <p:spPr>
+          <a:xfrm>
+            <a:off x="5029200" y="2514599"/>
+            <a:ext cx="381000" cy="521208"/>
+          </a:xfrm>
+          <a:prstGeom prst="straightConnector1">
+            <a:avLst/>
+          </a:prstGeom>
+          <a:ln>
+            <a:tailEnd type="arrow"/>
+          </a:ln>
+        </p:spPr>
+        <p:style>
+          <a:lnRef idx="3">
+            <a:schemeClr val="accent4"/>
+          </a:lnRef>
+          <a:fillRef idx="0">
+            <a:schemeClr val="accent4"/>
+          </a:fillRef>
+          <a:effectRef idx="2">
+            <a:schemeClr val="accent4"/>
+          </a:effectRef>
+          <a:fontRef idx="minor">
+            <a:schemeClr val="tx1"/>
+          </a:fontRef>
+        </p:style>
+      </p:cxnSp>
     </p:spTree>
     <p:extLst>
       <p:ext uri="{BB962C8B-B14F-4D97-AF65-F5344CB8AC3E}">

</xml_diff>

<commit_message>
Sign in page created
</commit_message>
<xml_diff>
--- a/Assignments/Gradebook App PowerPont/Austin Brand/Javascript_Gradebook_Storyboard.pptx
+++ b/Assignments/Gradebook App PowerPont/Austin Brand/Javascript_Gradebook_Storyboard.pptx
@@ -6551,6 +6551,175 @@
           <a:chExt cx="0" cy="0"/>
         </a:xfrm>
       </p:grpSpPr>
+      <p:sp>
+        <p:nvSpPr>
+          <p:cNvPr id="2" name="TextBox 1"/>
+          <p:cNvSpPr txBox="1"/>
+          <p:nvPr/>
+        </p:nvSpPr>
+        <p:spPr>
+          <a:xfrm>
+            <a:off x="609600" y="2514600"/>
+            <a:ext cx="1638300" cy="646331"/>
+          </a:xfrm>
+          <a:prstGeom prst="rect">
+            <a:avLst/>
+          </a:prstGeom>
+          <a:noFill/>
+        </p:spPr>
+        <p:txBody>
+          <a:bodyPr wrap="square" rtlCol="0">
+            <a:spAutoFit/>
+          </a:bodyPr>
+          <a:lstStyle/>
+          <a:p>
+            <a:r>
+              <a:rPr lang="en-US" sz="3600" dirty="0" smtClean="0"/>
+              <a:t>Email: </a:t>
+            </a:r>
+            <a:endParaRPr lang="en-US" sz="3600" dirty="0"/>
+          </a:p>
+        </p:txBody>
+      </p:sp>
+      <p:sp>
+        <p:nvSpPr>
+          <p:cNvPr id="3" name="TextBox 2"/>
+          <p:cNvSpPr txBox="1"/>
+          <p:nvPr/>
+        </p:nvSpPr>
+        <p:spPr>
+          <a:xfrm>
+            <a:off x="1066800" y="457200"/>
+            <a:ext cx="7010400" cy="1015663"/>
+          </a:xfrm>
+          <a:prstGeom prst="rect">
+            <a:avLst/>
+          </a:prstGeom>
+          <a:noFill/>
+        </p:spPr>
+        <p:txBody>
+          <a:bodyPr wrap="square" rtlCol="0">
+            <a:spAutoFit/>
+          </a:bodyPr>
+          <a:lstStyle/>
+          <a:p>
+            <a:pPr algn="ctr"/>
+            <a:r>
+              <a:rPr lang="en-US" sz="6000" dirty="0" smtClean="0"/>
+              <a:t>Sign in </a:t>
+            </a:r>
+            <a:endParaRPr lang="en-US" sz="6000" dirty="0"/>
+          </a:p>
+        </p:txBody>
+      </p:sp>
+      <p:sp>
+        <p:nvSpPr>
+          <p:cNvPr id="4" name="TextBox 3"/>
+          <p:cNvSpPr txBox="1"/>
+          <p:nvPr/>
+        </p:nvSpPr>
+        <p:spPr>
+          <a:xfrm>
+            <a:off x="609600" y="4191000"/>
+            <a:ext cx="2286000" cy="646331"/>
+          </a:xfrm>
+          <a:prstGeom prst="rect">
+            <a:avLst/>
+          </a:prstGeom>
+          <a:noFill/>
+        </p:spPr>
+        <p:txBody>
+          <a:bodyPr wrap="square" rtlCol="0">
+            <a:spAutoFit/>
+          </a:bodyPr>
+          <a:lstStyle/>
+          <a:p>
+            <a:r>
+              <a:rPr lang="en-US" sz="3600" dirty="0" smtClean="0"/>
+              <a:t>Password: </a:t>
+            </a:r>
+            <a:endParaRPr lang="en-US" sz="3600" dirty="0"/>
+          </a:p>
+        </p:txBody>
+      </p:sp>
+      <p:sp>
+        <p:nvSpPr>
+          <p:cNvPr id="5" name="TextBox 4"/>
+          <p:cNvSpPr txBox="1"/>
+          <p:nvPr/>
+        </p:nvSpPr>
+        <p:spPr>
+          <a:xfrm>
+            <a:off x="2057400" y="2667000"/>
+            <a:ext cx="2438400" cy="369332"/>
+          </a:xfrm>
+          <a:prstGeom prst="rect">
+            <a:avLst/>
+          </a:prstGeom>
+        </p:spPr>
+        <p:style>
+          <a:lnRef idx="2">
+            <a:schemeClr val="accent4"/>
+          </a:lnRef>
+          <a:fillRef idx="1">
+            <a:schemeClr val="lt1"/>
+          </a:fillRef>
+          <a:effectRef idx="0">
+            <a:schemeClr val="accent4"/>
+          </a:effectRef>
+          <a:fontRef idx="minor">
+            <a:schemeClr val="dk1"/>
+          </a:fontRef>
+        </p:style>
+        <p:txBody>
+          <a:bodyPr wrap="square" rtlCol="0">
+            <a:spAutoFit/>
+          </a:bodyPr>
+          <a:lstStyle/>
+          <a:p>
+            <a:endParaRPr lang="en-US" dirty="0"/>
+          </a:p>
+        </p:txBody>
+      </p:sp>
+      <p:sp>
+        <p:nvSpPr>
+          <p:cNvPr id="6" name="TextBox 5"/>
+          <p:cNvSpPr txBox="1"/>
+          <p:nvPr/>
+        </p:nvSpPr>
+        <p:spPr>
+          <a:xfrm>
+            <a:off x="2819400" y="4329499"/>
+            <a:ext cx="2438400" cy="369332"/>
+          </a:xfrm>
+          <a:prstGeom prst="rect">
+            <a:avLst/>
+          </a:prstGeom>
+        </p:spPr>
+        <p:style>
+          <a:lnRef idx="2">
+            <a:schemeClr val="accent4"/>
+          </a:lnRef>
+          <a:fillRef idx="1">
+            <a:schemeClr val="lt1"/>
+          </a:fillRef>
+          <a:effectRef idx="0">
+            <a:schemeClr val="accent4"/>
+          </a:effectRef>
+          <a:fontRef idx="minor">
+            <a:schemeClr val="dk1"/>
+          </a:fontRef>
+        </p:style>
+        <p:txBody>
+          <a:bodyPr wrap="square" rtlCol="0">
+            <a:spAutoFit/>
+          </a:bodyPr>
+          <a:lstStyle/>
+          <a:p>
+            <a:endParaRPr lang="en-US" dirty="0"/>
+          </a:p>
+        </p:txBody>
+      </p:sp>
     </p:spTree>
     <p:extLst>
       <p:ext uri="{BB962C8B-B14F-4D97-AF65-F5344CB8AC3E}">

</xml_diff>

<commit_message>
extra add edit and delete
</commit_message>
<xml_diff>
--- a/Assignments/Gradebook App PowerPont/Austin Brand/Javascript_Gradebook_Storyboard.pptx
+++ b/Assignments/Gradebook App PowerPont/Austin Brand/Javascript_Gradebook_Storyboard.pptx
@@ -4211,7 +4211,7 @@
         </p:blipFill>
         <p:spPr bwMode="auto">
           <a:xfrm>
-            <a:off x="-52820" y="49049"/>
+            <a:off x="-52820" y="70389"/>
             <a:ext cx="2415020" cy="1148811"/>
           </a:xfrm>
           <a:prstGeom prst="rect">
@@ -5109,7 +5109,7 @@
           <p:nvPr>
             <p:extLst>
               <p:ext uri="{D42A27DB-BD31-4B8C-83A1-F6EECF244321}">
-                <p14:modId xmlns:p14="http://schemas.microsoft.com/office/powerpoint/2010/main" val="375725391"/>
+                <p14:modId xmlns:p14="http://schemas.microsoft.com/office/powerpoint/2010/main" val="2028067315"/>
               </p:ext>
             </p:extLst>
           </p:nvPr>
@@ -5582,7 +5582,7 @@
                     <a:bodyPr/>
                     <a:lstStyle/>
                     <a:p>
-                      <a:endParaRPr lang="en-US"/>
+                      <a:endParaRPr lang="en-US" dirty="0"/>
                     </a:p>
                   </a:txBody>
                   <a:tcPr/>
@@ -5663,6 +5663,176 @@
               <a:t>Grades</a:t>
             </a:r>
             <a:endParaRPr lang="en-US" sz="2400" dirty="0"/>
+          </a:p>
+        </p:txBody>
+      </p:sp>
+      <p:sp>
+        <p:nvSpPr>
+          <p:cNvPr id="2" name="Rectangle 1"/>
+          <p:cNvSpPr/>
+          <p:nvPr/>
+        </p:nvSpPr>
+        <p:spPr>
+          <a:xfrm>
+            <a:off x="2514600" y="5791200"/>
+            <a:ext cx="6400800" cy="914400"/>
+          </a:xfrm>
+          <a:prstGeom prst="rect">
+            <a:avLst/>
+          </a:prstGeom>
+        </p:spPr>
+        <p:style>
+          <a:lnRef idx="2">
+            <a:schemeClr val="accent1">
+              <a:shade val="50000"/>
+            </a:schemeClr>
+          </a:lnRef>
+          <a:fillRef idx="1">
+            <a:schemeClr val="accent1"/>
+          </a:fillRef>
+          <a:effectRef idx="0">
+            <a:schemeClr val="accent1"/>
+          </a:effectRef>
+          <a:fontRef idx="minor">
+            <a:schemeClr val="lt1"/>
+          </a:fontRef>
+        </p:style>
+        <p:txBody>
+          <a:bodyPr rtlCol="0" anchor="ctr"/>
+          <a:lstStyle/>
+          <a:p>
+            <a:pPr algn="ctr"/>
+            <a:endParaRPr lang="en-US"/>
+          </a:p>
+        </p:txBody>
+      </p:sp>
+      <p:sp>
+        <p:nvSpPr>
+          <p:cNvPr id="10" name="TextBox 9"/>
+          <p:cNvSpPr txBox="1"/>
+          <p:nvPr/>
+        </p:nvSpPr>
+        <p:spPr>
+          <a:xfrm>
+            <a:off x="2819400" y="6063734"/>
+            <a:ext cx="1600200" cy="369332"/>
+          </a:xfrm>
+          <a:prstGeom prst="rect">
+            <a:avLst/>
+          </a:prstGeom>
+        </p:spPr>
+        <p:style>
+          <a:lnRef idx="2">
+            <a:schemeClr val="accent2"/>
+          </a:lnRef>
+          <a:fillRef idx="1">
+            <a:schemeClr val="lt1"/>
+          </a:fillRef>
+          <a:effectRef idx="0">
+            <a:schemeClr val="accent2"/>
+          </a:effectRef>
+          <a:fontRef idx="minor">
+            <a:schemeClr val="dk1"/>
+          </a:fontRef>
+        </p:style>
+        <p:txBody>
+          <a:bodyPr wrap="square" rtlCol="0">
+            <a:spAutoFit/>
+          </a:bodyPr>
+          <a:lstStyle/>
+          <a:p>
+            <a:pPr algn="ctr"/>
+            <a:r>
+              <a:rPr lang="en-US" dirty="0" smtClean="0"/>
+              <a:t>Add </a:t>
+            </a:r>
+            <a:endParaRPr lang="en-US" dirty="0"/>
+          </a:p>
+        </p:txBody>
+      </p:sp>
+      <p:sp>
+        <p:nvSpPr>
+          <p:cNvPr id="15" name="Rectangle 14"/>
+          <p:cNvSpPr/>
+          <p:nvPr/>
+        </p:nvSpPr>
+        <p:spPr>
+          <a:xfrm>
+            <a:off x="4914900" y="6063734"/>
+            <a:ext cx="1600200" cy="369332"/>
+          </a:xfrm>
+          <a:prstGeom prst="rect">
+            <a:avLst/>
+          </a:prstGeom>
+        </p:spPr>
+        <p:style>
+          <a:lnRef idx="2">
+            <a:schemeClr val="accent3"/>
+          </a:lnRef>
+          <a:fillRef idx="1">
+            <a:schemeClr val="lt1"/>
+          </a:fillRef>
+          <a:effectRef idx="0">
+            <a:schemeClr val="accent3"/>
+          </a:effectRef>
+          <a:fontRef idx="minor">
+            <a:schemeClr val="dk1"/>
+          </a:fontRef>
+        </p:style>
+        <p:txBody>
+          <a:bodyPr rtlCol="0" anchor="ctr"/>
+          <a:lstStyle/>
+          <a:p>
+            <a:pPr algn="ctr"/>
+            <a:r>
+              <a:rPr lang="en-US" dirty="0" smtClean="0"/>
+              <a:t>Edit</a:t>
+            </a:r>
+            <a:endParaRPr lang="en-US" dirty="0"/>
+          </a:p>
+        </p:txBody>
+      </p:sp>
+      <p:sp>
+        <p:nvSpPr>
+          <p:cNvPr id="16" name="TextBox 15"/>
+          <p:cNvSpPr txBox="1"/>
+          <p:nvPr/>
+        </p:nvSpPr>
+        <p:spPr>
+          <a:xfrm>
+            <a:off x="6998594" y="6058763"/>
+            <a:ext cx="1447800" cy="369332"/>
+          </a:xfrm>
+          <a:prstGeom prst="rect">
+            <a:avLst/>
+          </a:prstGeom>
+        </p:spPr>
+        <p:style>
+          <a:lnRef idx="2">
+            <a:schemeClr val="accent2"/>
+          </a:lnRef>
+          <a:fillRef idx="1">
+            <a:schemeClr val="lt1"/>
+          </a:fillRef>
+          <a:effectRef idx="0">
+            <a:schemeClr val="accent2"/>
+          </a:effectRef>
+          <a:fontRef idx="minor">
+            <a:schemeClr val="dk1"/>
+          </a:fontRef>
+        </p:style>
+        <p:txBody>
+          <a:bodyPr wrap="square" rtlCol="0">
+            <a:spAutoFit/>
+          </a:bodyPr>
+          <a:lstStyle/>
+          <a:p>
+            <a:pPr algn="ctr"/>
+            <a:r>
+              <a:rPr lang="en-US" dirty="0" smtClean="0"/>
+              <a:t>Delete</a:t>
+            </a:r>
+            <a:endParaRPr lang="en-US" dirty="0"/>
           </a:p>
         </p:txBody>
       </p:sp>

</xml_diff>